<commit_message>
Embed fonts in PPT
</commit_message>
<xml_diff>
--- a/svlib/doc/163-aq602-draft1.pptx
+++ b/svlib/doc/163-aq602-draft1.pptx
@@ -1,6 +1,6 @@
 
 <file path=ppt/presentation.xml><?xml version="1.0" encoding="utf-8"?>
-<p:presentation xmlns:a="http://schemas.openxmlformats.org/drawingml/2006/main" xmlns:r="http://schemas.openxmlformats.org/officeDocument/2006/relationships" xmlns:p="http://schemas.openxmlformats.org/presentationml/2006/main" saveSubsetFonts="1">
+<p:presentation xmlns:a="http://schemas.openxmlformats.org/drawingml/2006/main" xmlns:r="http://schemas.openxmlformats.org/officeDocument/2006/relationships" xmlns:p="http://schemas.openxmlformats.org/presentationml/2006/main" embedTrueTypeFonts="1">
   <p:sldMasterIdLst>
     <p:sldMasterId id="2147483660" r:id="rId1"/>
   </p:sldMasterIdLst>
@@ -27,6 +27,15 @@
   </p:sldIdLst>
   <p:sldSz cx="9144000" cy="6858000" type="screen4x3"/>
   <p:notesSz cx="6858000" cy="9144000"/>
+  <p:embeddedFontLst>
+    <p:embeddedFont>
+      <p:font typeface="Calibri" pitchFamily="34" charset="0"/>
+      <p:regular r:id="rId19"/>
+      <p:bold r:id="rId20"/>
+      <p:italic r:id="rId21"/>
+      <p:boldItalic r:id="rId22"/>
+    </p:embeddedFont>
+  </p:embeddedFontLst>
   <p:defaultTextStyle>
     <a:defPPr>
       <a:defRPr lang="en-US"/>
@@ -907,24 +916,7 @@
                 <a:ea typeface="+mn-ea"/>
                 <a:cs typeface="+mn-cs"/>
               </a:rPr>
-              <a:t> of </a:t>
-            </a:r>
-            <a:r>
-              <a:rPr kumimoji="0" lang="en-US" sz="1200" b="0" i="0" u="none" strike="noStrike" kern="1200" cap="none" spc="0" normalizeH="0" baseline="0" noProof="0" smtClean="0">
-                <a:ln>
-                  <a:noFill/>
-                </a:ln>
-                <a:solidFill>
-                  <a:schemeClr val="bg1"/>
-                </a:solidFill>
-                <a:effectLst/>
-                <a:uLnTx/>
-                <a:uFillTx/>
-                <a:latin typeface="+mn-lt"/>
-                <a:ea typeface="+mn-ea"/>
-                <a:cs typeface="+mn-cs"/>
-              </a:rPr>
-              <a:t>??</a:t>
+              <a:t> of ??</a:t>
             </a:r>
             <a:endParaRPr kumimoji="0" lang="en-US" sz="1200" b="0" i="0" u="none" strike="noStrike" kern="1200" cap="none" spc="0" normalizeH="0" baseline="0" noProof="0">
               <a:ln>
@@ -1144,7 +1136,7 @@
     </p:spTree>
     <p:extLst>
       <p:ext uri="{BB962C8B-B14F-4D97-AF65-F5344CB8AC3E}">
-        <p14:creationId xmlns="" xmlns:p14="http://schemas.microsoft.com/office/powerpoint/2010/main" val="989869968"/>
+        <p14:creationId xmlns:p14="http://schemas.microsoft.com/office/powerpoint/2010/main" xmlns="" val="989869968"/>
       </p:ext>
     </p:extLst>
   </p:cSld>
@@ -1332,7 +1324,7 @@
     </p:spTree>
     <p:extLst>
       <p:ext uri="{BB962C8B-B14F-4D97-AF65-F5344CB8AC3E}">
-        <p14:creationId xmlns="" xmlns:p14="http://schemas.microsoft.com/office/powerpoint/2010/main" val="1452775338"/>
+        <p14:creationId xmlns:p14="http://schemas.microsoft.com/office/powerpoint/2010/main" xmlns="" val="1452775338"/>
       </p:ext>
     </p:extLst>
   </p:cSld>
@@ -1520,7 +1512,7 @@
     </p:spTree>
     <p:extLst>
       <p:ext uri="{BB962C8B-B14F-4D97-AF65-F5344CB8AC3E}">
-        <p14:creationId xmlns="" xmlns:p14="http://schemas.microsoft.com/office/powerpoint/2010/main" val="3894337954"/>
+        <p14:creationId xmlns:p14="http://schemas.microsoft.com/office/powerpoint/2010/main" xmlns="" val="3894337954"/>
       </p:ext>
     </p:extLst>
   </p:cSld>
@@ -1770,7 +1762,7 @@
     </p:spTree>
     <p:extLst>
       <p:ext uri="{BB962C8B-B14F-4D97-AF65-F5344CB8AC3E}">
-        <p14:creationId xmlns="" xmlns:p14="http://schemas.microsoft.com/office/powerpoint/2010/main" val="1362160421"/>
+        <p14:creationId xmlns:p14="http://schemas.microsoft.com/office/powerpoint/2010/main" xmlns="" val="1362160421"/>
       </p:ext>
     </p:extLst>
   </p:cSld>
@@ -1958,7 +1950,7 @@
     </p:spTree>
     <p:extLst>
       <p:ext uri="{BB962C8B-B14F-4D97-AF65-F5344CB8AC3E}">
-        <p14:creationId xmlns="" xmlns:p14="http://schemas.microsoft.com/office/powerpoint/2010/main" val="1001508708"/>
+        <p14:creationId xmlns:p14="http://schemas.microsoft.com/office/powerpoint/2010/main" xmlns="" val="1001508708"/>
       </p:ext>
     </p:extLst>
   </p:cSld>
@@ -2212,7 +2204,7 @@
     </p:spTree>
     <p:extLst>
       <p:ext uri="{BB962C8B-B14F-4D97-AF65-F5344CB8AC3E}">
-        <p14:creationId xmlns="" xmlns:p14="http://schemas.microsoft.com/office/powerpoint/2010/main" val="3465844944"/>
+        <p14:creationId xmlns:p14="http://schemas.microsoft.com/office/powerpoint/2010/main" xmlns="" val="3465844944"/>
       </p:ext>
     </p:extLst>
   </p:cSld>
@@ -2516,7 +2508,7 @@
     </p:spTree>
     <p:extLst>
       <p:ext uri="{BB962C8B-B14F-4D97-AF65-F5344CB8AC3E}">
-        <p14:creationId xmlns="" xmlns:p14="http://schemas.microsoft.com/office/powerpoint/2010/main" val="3500538590"/>
+        <p14:creationId xmlns:p14="http://schemas.microsoft.com/office/powerpoint/2010/main" xmlns="" val="3500538590"/>
       </p:ext>
     </p:extLst>
   </p:cSld>
@@ -2960,7 +2952,7 @@
     </p:spTree>
     <p:extLst>
       <p:ext uri="{BB962C8B-B14F-4D97-AF65-F5344CB8AC3E}">
-        <p14:creationId xmlns="" xmlns:p14="http://schemas.microsoft.com/office/powerpoint/2010/main" val="1822163244"/>
+        <p14:creationId xmlns:p14="http://schemas.microsoft.com/office/powerpoint/2010/main" xmlns="" val="1822163244"/>
       </p:ext>
     </p:extLst>
   </p:cSld>
@@ -3057,7 +3049,7 @@
     </p:spTree>
     <p:extLst>
       <p:ext uri="{BB962C8B-B14F-4D97-AF65-F5344CB8AC3E}">
-        <p14:creationId xmlns="" xmlns:p14="http://schemas.microsoft.com/office/powerpoint/2010/main" val="2405767068"/>
+        <p14:creationId xmlns:p14="http://schemas.microsoft.com/office/powerpoint/2010/main" xmlns="" val="2405767068"/>
       </p:ext>
     </p:extLst>
   </p:cSld>
@@ -3345,7 +3337,7 @@
     </p:spTree>
     <p:extLst>
       <p:ext uri="{BB962C8B-B14F-4D97-AF65-F5344CB8AC3E}">
-        <p14:creationId xmlns="" xmlns:p14="http://schemas.microsoft.com/office/powerpoint/2010/main" val="1001517974"/>
+        <p14:creationId xmlns:p14="http://schemas.microsoft.com/office/powerpoint/2010/main" xmlns="" val="1001517974"/>
       </p:ext>
     </p:extLst>
   </p:cSld>
@@ -3609,7 +3601,7 @@
     </p:spTree>
     <p:extLst>
       <p:ext uri="{BB962C8B-B14F-4D97-AF65-F5344CB8AC3E}">
-        <p14:creationId xmlns="" xmlns:p14="http://schemas.microsoft.com/office/powerpoint/2010/main" val="1032843098"/>
+        <p14:creationId xmlns:p14="http://schemas.microsoft.com/office/powerpoint/2010/main" xmlns="" val="1032843098"/>
       </p:ext>
     </p:extLst>
   </p:cSld>
@@ -3769,7 +3761,7 @@
     </p:spTree>
     <p:extLst>
       <p:ext uri="{BB962C8B-B14F-4D97-AF65-F5344CB8AC3E}">
-        <p14:creationId xmlns="" xmlns:p14="http://schemas.microsoft.com/office/powerpoint/2010/main" val="2425591320"/>
+        <p14:creationId xmlns:p14="http://schemas.microsoft.com/office/powerpoint/2010/main" xmlns="" val="2425591320"/>
       </p:ext>
     </p:extLst>
   </p:cSld>
@@ -4186,7 +4178,7 @@
     </p:spTree>
     <p:extLst>
       <p:ext uri="{BB962C8B-B14F-4D97-AF65-F5344CB8AC3E}">
-        <p14:creationId xmlns="" xmlns:p14="http://schemas.microsoft.com/office/powerpoint/2010/main" val="3983013449"/>
+        <p14:creationId xmlns:p14="http://schemas.microsoft.com/office/powerpoint/2010/main" xmlns="" val="3983013449"/>
       </p:ext>
     </p:extLst>
   </p:cSld>
@@ -4363,10 +4355,6 @@
               </a:rPr>
               <a:t>("MISSING/FILE");</a:t>
             </a:r>
-            <a:endParaRPr lang="en-GB" b="1" smtClean="0">
-              <a:latin typeface="Courier New" pitchFamily="49" charset="0"/>
-              <a:cs typeface="Courier New" pitchFamily="49" charset="0"/>
-            </a:endParaRPr>
           </a:p>
         </p:txBody>
       </p:sp>
@@ -4455,21 +4443,7 @@
                 <a:latin typeface="Courier New" pitchFamily="49" charset="0"/>
                 <a:cs typeface="Courier New" pitchFamily="49" charset="0"/>
               </a:rPr>
-              <a:t> </a:t>
-            </a:r>
-            <a:r>
-              <a:rPr lang="en-GB" sz="2000" b="1" smtClean="0">
-                <a:latin typeface="Courier New" pitchFamily="49" charset="0"/>
-                <a:cs typeface="Courier New" pitchFamily="49" charset="0"/>
-              </a:rPr>
-              <a:t>   </a:t>
-            </a:r>
-            <a:r>
-              <a:rPr lang="en-GB" sz="2000" b="1" smtClean="0">
-                <a:latin typeface="Courier New" pitchFamily="49" charset="0"/>
-                <a:cs typeface="Courier New" pitchFamily="49" charset="0"/>
-              </a:rPr>
-              <a:t>(No such file or directory)</a:t>
+              <a:t>    (No such file or directory)</a:t>
             </a:r>
             <a:endParaRPr kumimoji="0" lang="en-GB" sz="2000" b="0" i="0" u="none" strike="noStrike" kern="1200" cap="none" spc="0" normalizeH="0" baseline="0" noProof="0" dirty="0" smtClean="0">
               <a:ln>
@@ -4699,14 +4673,7 @@
                 <a:latin typeface="Courier New" pitchFamily="49" charset="0"/>
                 <a:cs typeface="Courier New" pitchFamily="49" charset="0"/>
               </a:rPr>
-              <a:t> </a:t>
-            </a:r>
-            <a:r>
-              <a:rPr lang="en-GB" b="1" smtClean="0">
-                <a:latin typeface="Courier New" pitchFamily="49" charset="0"/>
-                <a:cs typeface="Courier New" pitchFamily="49" charset="0"/>
-              </a:rPr>
-              <a:t> $display("whoops, my bad: %s", </a:t>
+              <a:t>  $display("whoops, my bad: %s", </a:t>
             </a:r>
             <a:r>
               <a:rPr lang="en-GB" b="1" smtClean="0">
@@ -4725,10 +4692,6 @@
               </a:rPr>
               <a:t>());</a:t>
             </a:r>
-            <a:endParaRPr lang="en-GB" b="1" smtClean="0">
-              <a:latin typeface="Courier New" pitchFamily="49" charset="0"/>
-              <a:cs typeface="Courier New" pitchFamily="49" charset="0"/>
-            </a:endParaRPr>
           </a:p>
         </p:txBody>
       </p:sp>
@@ -4874,7 +4837,6 @@
               <a:rPr lang="en-US" smtClean="0"/>
               <a:t>Ready for future addition of an object factory</a:t>
             </a:r>
-            <a:endParaRPr lang="en-US" smtClean="0"/>
           </a:p>
         </p:txBody>
       </p:sp>
@@ -4929,110 +4891,61 @@
                 <a:latin typeface="Courier New" pitchFamily="49" charset="0"/>
                 <a:cs typeface="Courier New" pitchFamily="49" charset="0"/>
               </a:rPr>
-              <a:t>`</a:t>
-            </a:r>
-            <a:r>
-              <a:rPr lang="en-GB" b="1" smtClean="0">
-                <a:latin typeface="Courier New" pitchFamily="49" charset="0"/>
-                <a:cs typeface="Courier New" pitchFamily="49" charset="0"/>
-              </a:rPr>
-              <a:t>ifdef SVLIB_NO_RANDSTABLE_NEW</a:t>
-            </a:r>
-          </a:p>
-          <a:p>
-            <a:r>
-              <a:rPr lang="en-GB" b="1" smtClean="0">
-                <a:latin typeface="Courier New" pitchFamily="49" charset="0"/>
-                <a:cs typeface="Courier New" pitchFamily="49" charset="0"/>
-              </a:rPr>
-              <a:t>result </a:t>
-            </a:r>
-            <a:r>
-              <a:rPr lang="en-GB" b="1" smtClean="0">
-                <a:latin typeface="Courier New" pitchFamily="49" charset="0"/>
-                <a:cs typeface="Courier New" pitchFamily="49" charset="0"/>
-              </a:rPr>
-              <a:t>= new();</a:t>
-            </a:r>
-          </a:p>
-          <a:p>
-            <a:r>
-              <a:rPr lang="en-GB" b="1" smtClean="0">
-                <a:latin typeface="Courier New" pitchFamily="49" charset="0"/>
-                <a:cs typeface="Courier New" pitchFamily="49" charset="0"/>
-              </a:rPr>
-              <a:t>`</a:t>
-            </a:r>
-            <a:r>
-              <a:rPr lang="en-GB" b="1" smtClean="0">
-                <a:latin typeface="Courier New" pitchFamily="49" charset="0"/>
-                <a:cs typeface="Courier New" pitchFamily="49" charset="0"/>
-              </a:rPr>
-              <a:t>else</a:t>
-            </a:r>
-          </a:p>
-          <a:p>
-            <a:r>
-              <a:rPr lang="en-GB" b="1" smtClean="0">
-                <a:latin typeface="Courier New" pitchFamily="49" charset="0"/>
-                <a:cs typeface="Courier New" pitchFamily="49" charset="0"/>
-              </a:rPr>
-              <a:t>std</a:t>
-            </a:r>
-            <a:r>
-              <a:rPr lang="en-GB" b="1" smtClean="0">
-                <a:latin typeface="Courier New" pitchFamily="49" charset="0"/>
-                <a:cs typeface="Courier New" pitchFamily="49" charset="0"/>
-              </a:rPr>
-              <a:t>::process p = std::process::self();</a:t>
-            </a:r>
-          </a:p>
-          <a:p>
-            <a:r>
-              <a:rPr lang="en-GB" b="1" smtClean="0">
-                <a:latin typeface="Courier New" pitchFamily="49" charset="0"/>
-                <a:cs typeface="Courier New" pitchFamily="49" charset="0"/>
-              </a:rPr>
-              <a:t>string </a:t>
-            </a:r>
-            <a:r>
-              <a:rPr lang="en-GB" b="1" smtClean="0">
-                <a:latin typeface="Courier New" pitchFamily="49" charset="0"/>
-                <a:cs typeface="Courier New" pitchFamily="49" charset="0"/>
-              </a:rPr>
-              <a:t>randstate = p.get_randstate();</a:t>
-            </a:r>
-          </a:p>
-          <a:p>
-            <a:r>
-              <a:rPr lang="en-GB" b="1" smtClean="0">
-                <a:latin typeface="Courier New" pitchFamily="49" charset="0"/>
-                <a:cs typeface="Courier New" pitchFamily="49" charset="0"/>
-              </a:rPr>
-              <a:t>result </a:t>
-            </a:r>
-            <a:r>
-              <a:rPr lang="en-GB" b="1" smtClean="0">
-                <a:latin typeface="Courier New" pitchFamily="49" charset="0"/>
-                <a:cs typeface="Courier New" pitchFamily="49" charset="0"/>
-              </a:rPr>
-              <a:t>= new();</a:t>
-            </a:r>
-          </a:p>
-          <a:p>
-            <a:r>
-              <a:rPr lang="en-GB" b="1" smtClean="0">
-                <a:latin typeface="Courier New" pitchFamily="49" charset="0"/>
-                <a:cs typeface="Courier New" pitchFamily="49" charset="0"/>
-              </a:rPr>
-              <a:t>p.set_randstate(randstate</a:t>
-            </a:r>
-            <a:r>
-              <a:rPr lang="en-GB" b="1" smtClean="0">
-                <a:latin typeface="Courier New" pitchFamily="49" charset="0"/>
-                <a:cs typeface="Courier New" pitchFamily="49" charset="0"/>
-              </a:rPr>
-              <a:t>);</a:t>
+              <a:t>`ifdef SVLIB_NO_RANDSTABLE_NEW</a:t>
+            </a:r>
+          </a:p>
+          <a:p>
+            <a:r>
+              <a:rPr lang="en-GB" b="1" smtClean="0">
+                <a:latin typeface="Courier New" pitchFamily="49" charset="0"/>
+                <a:cs typeface="Courier New" pitchFamily="49" charset="0"/>
+              </a:rPr>
+              <a:t>result = new();</a:t>
+            </a:r>
+          </a:p>
+          <a:p>
+            <a:r>
+              <a:rPr lang="en-GB" b="1" smtClean="0">
+                <a:latin typeface="Courier New" pitchFamily="49" charset="0"/>
+                <a:cs typeface="Courier New" pitchFamily="49" charset="0"/>
+              </a:rPr>
+              <a:t>`else</a:t>
+            </a:r>
+          </a:p>
+          <a:p>
+            <a:r>
+              <a:rPr lang="en-GB" b="1" smtClean="0">
+                <a:latin typeface="Courier New" pitchFamily="49" charset="0"/>
+                <a:cs typeface="Courier New" pitchFamily="49" charset="0"/>
+              </a:rPr>
+              <a:t>std::process p = std::process::self();</a:t>
+            </a:r>
+          </a:p>
+          <a:p>
+            <a:r>
+              <a:rPr lang="en-GB" b="1" smtClean="0">
+                <a:latin typeface="Courier New" pitchFamily="49" charset="0"/>
+                <a:cs typeface="Courier New" pitchFamily="49" charset="0"/>
+              </a:rPr>
+              <a:t>string randstate = p.get_randstate();</a:t>
+            </a:r>
+          </a:p>
+          <a:p>
+            <a:r>
+              <a:rPr lang="en-GB" b="1" smtClean="0">
+                <a:latin typeface="Courier New" pitchFamily="49" charset="0"/>
+                <a:cs typeface="Courier New" pitchFamily="49" charset="0"/>
+              </a:rPr>
+              <a:t>result = new();</a:t>
+            </a:r>
+          </a:p>
+          <a:p>
+            <a:r>
+              <a:rPr lang="en-GB" b="1" smtClean="0">
+                <a:latin typeface="Courier New" pitchFamily="49" charset="0"/>
+                <a:cs typeface="Courier New" pitchFamily="49" charset="0"/>
+              </a:rPr>
+              <a:t>p.set_randstate(randstate);</a:t>
             </a:r>
           </a:p>
           <a:p>
@@ -5043,10 +4956,6 @@
               </a:rPr>
               <a:t>`endif</a:t>
             </a:r>
-            <a:endParaRPr lang="en-GB" b="1" smtClean="0">
-              <a:latin typeface="Courier New" pitchFamily="49" charset="0"/>
-              <a:cs typeface="Courier New" pitchFamily="49" charset="0"/>
-            </a:endParaRPr>
           </a:p>
         </p:txBody>
       </p:sp>
@@ -5254,19 +5163,8 @@
                 <a:latin typeface="Courier New" pitchFamily="49" charset="0"/>
                 <a:cs typeface="Courier New" pitchFamily="49" charset="0"/>
               </a:rPr>
-              <a:t>("an</a:t>
-            </a:r>
-            <a:r>
-              <a:rPr lang="en-GB" b="1" smtClean="0">
-                <a:latin typeface="Courier New" pitchFamily="49" charset="0"/>
-                <a:cs typeface="Courier New" pitchFamily="49" charset="0"/>
-              </a:rPr>
-              <a:t>(.)");</a:t>
-            </a:r>
-            <a:endParaRPr lang="en-GB" b="1" smtClean="0">
-              <a:latin typeface="Courier New" pitchFamily="49" charset="0"/>
-              <a:cs typeface="Courier New" pitchFamily="49" charset="0"/>
-            </a:endParaRPr>
+              <a:t>("an(.)");</a:t>
+            </a:r>
           </a:p>
         </p:txBody>
       </p:sp>
@@ -5313,11 +5211,7 @@
             <a:pPr algn="ctr"/>
             <a:r>
               <a:rPr lang="en-GB" sz="2000" smtClean="0"/>
-              <a:t>don't</a:t>
-            </a:r>
-            <a:r>
-              <a:rPr lang="en-GB" sz="2000" smtClean="0"/>
-              <a:t> call </a:t>
+              <a:t>don't call </a:t>
             </a:r>
             <a:r>
               <a:rPr lang="en-GB" sz="2000" b="1" smtClean="0">
@@ -5424,15 +5318,7 @@
           <a:p>
             <a:r>
               <a:rPr lang="en-US" smtClean="0"/>
-              <a:t>Test early, </a:t>
-            </a:r>
-            <a:r>
-              <a:rPr lang="en-US" smtClean="0"/>
-              <a:t>often, </a:t>
-            </a:r>
-            <a:r>
-              <a:rPr lang="en-US" smtClean="0"/>
-              <a:t>and on many platforms</a:t>
+              <a:t>Test early, often, and on many platforms</a:t>
             </a:r>
           </a:p>
           <a:p>
@@ -5458,15 +5344,7 @@
           <a:p>
             <a:r>
               <a:rPr lang="en-US" smtClean="0"/>
-              <a:t>Never throw an error </a:t>
-            </a:r>
-            <a:r>
-              <a:rPr lang="en-US" smtClean="0"/>
-              <a:t>from C </a:t>
-            </a:r>
-            <a:r>
-              <a:rPr lang="en-US" smtClean="0"/>
-              <a:t>code</a:t>
+              <a:t>Never throw an error from C code</a:t>
             </a:r>
           </a:p>
           <a:p>
@@ -6115,7 +5993,6 @@
               <a:rPr lang="en-US" smtClean="0"/>
               <a:t>General number reader</a:t>
             </a:r>
-            <a:endParaRPr lang="en-US" smtClean="0"/>
           </a:p>
         </p:txBody>
       </p:sp>
@@ -6196,26 +6073,8 @@
                 <a:latin typeface="Courier New" pitchFamily="49" charset="0"/>
                 <a:cs typeface="Courier New" pitchFamily="49" charset="0"/>
               </a:rPr>
-              <a:t> </a:t>
-            </a:r>
-            <a:r>
-              <a:rPr lang="en-GB" b="1" smtClean="0">
-                <a:latin typeface="Courier New" pitchFamily="49" charset="0"/>
-                <a:cs typeface="Courier New" pitchFamily="49" charset="0"/>
-              </a:rPr>
-              <a:t> </a:t>
-            </a:r>
-            <a:r>
-              <a:rPr lang="en-GB" b="1" smtClean="0">
-                <a:latin typeface="Courier New" pitchFamily="49" charset="0"/>
-                <a:cs typeface="Courier New" pitchFamily="49" charset="0"/>
-              </a:rPr>
-              <a:t>$display("value = %0d", value);</a:t>
-            </a:r>
-            <a:endParaRPr lang="en-GB" b="1" smtClean="0">
-              <a:latin typeface="Courier New" pitchFamily="49" charset="0"/>
-              <a:cs typeface="Courier New" pitchFamily="49" charset="0"/>
-            </a:endParaRPr>
+              <a:t>  $display("value = %0d", value);</a:t>
+            </a:r>
           </a:p>
         </p:txBody>
       </p:sp>
@@ -6429,14 +6288,7 @@
                 <a:latin typeface="Courier New" pitchFamily="49" charset="0"/>
                 <a:cs typeface="Courier New" pitchFamily="49" charset="0"/>
               </a:rPr>
-              <a:t> </a:t>
-            </a:r>
-            <a:r>
-              <a:rPr lang="en-GB" b="1" smtClean="0">
-                <a:latin typeface="Courier New" pitchFamily="49" charset="0"/>
-                <a:cs typeface="Courier New" pitchFamily="49" charset="0"/>
-              </a:rPr>
-              <a:t> $display("[%0d] %s=%0d", step, E.name, E);</a:t>
+              <a:t>  $display("[%0d] %s=%0d", step, E.name, E);</a:t>
             </a:r>
           </a:p>
         </p:txBody>
@@ -6716,14 +6568,7 @@
                 <a:latin typeface="Courier New" pitchFamily="49" charset="0"/>
                 <a:cs typeface="Courier New" pitchFamily="49" charset="0"/>
               </a:rPr>
-              <a:t> </a:t>
-            </a:r>
-            <a:r>
-              <a:rPr lang="en-GB" b="1" smtClean="0">
-                <a:latin typeface="Courier New" pitchFamily="49" charset="0"/>
-                <a:cs typeface="Courier New" pitchFamily="49" charset="0"/>
-              </a:rPr>
-              <a:t> $display("[%0d] %s", line_number, line);</a:t>
+              <a:t>  $display("[%0d] %s", line_number, line);</a:t>
             </a:r>
           </a:p>
           <a:p>
@@ -6734,10 +6579,6 @@
               </a:rPr>
               <a:t>$close(fid);</a:t>
             </a:r>
-            <a:endParaRPr lang="en-GB" b="1" smtClean="0">
-              <a:latin typeface="Courier New" pitchFamily="49" charset="0"/>
-              <a:cs typeface="Courier New" pitchFamily="49" charset="0"/>
-            </a:endParaRPr>
           </a:p>
         </p:txBody>
       </p:sp>
@@ -6830,10 +6671,6 @@
             <a:r>
               <a:rPr lang="en-US" smtClean="0"/>
               <a:t>Just a bunch of stuff SV</a:t>
-            </a:r>
-            <a:r>
-              <a:rPr lang="en-US" smtClean="0"/>
-              <a:t/>
             </a:r>
             <a:br>
               <a:rPr lang="en-US" smtClean="0"/>
@@ -7049,7 +6886,6 @@
               <a:rPr lang="en-US" smtClean="0"/>
               <a:t>Free download:</a:t>
             </a:r>
-            <a:endParaRPr lang="en-US" smtClean="0"/>
           </a:p>
         </p:txBody>
       </p:sp>
@@ -13404,11 +13240,7 @@
           <a:p>
             <a:r>
               <a:rPr lang="en-US" smtClean="0"/>
-              <a:t>Objects </a:t>
-            </a:r>
-            <a:r>
-              <a:rPr lang="en-US" smtClean="0"/>
-              <a:t>or simple functions?</a:t>
+              <a:t>Objects or simple functions?</a:t>
             </a:r>
           </a:p>
           <a:p>
@@ -13422,7 +13254,6 @@
               <a:rPr lang="en-US" smtClean="0"/>
               <a:t>Never disturb random stability</a:t>
             </a:r>
-            <a:endParaRPr lang="en-US" smtClean="0"/>
           </a:p>
           <a:p>
             <a:endParaRPr lang="en-US" smtClean="0"/>

</xml_diff>

<commit_message>
Use hi-res Verilab logo
</commit_message>
<xml_diff>
--- a/svlib/doc/163-aq602-draft1.pptx
+++ b/svlib/doc/163-aq602-draft1.pptx
@@ -1136,7 +1136,7 @@
     </p:spTree>
     <p:extLst>
       <p:ext uri="{BB962C8B-B14F-4D97-AF65-F5344CB8AC3E}">
-        <p14:creationId xmlns:p14="http://schemas.microsoft.com/office/powerpoint/2010/main" xmlns="" val="989869968"/>
+        <p14:creationId xmlns="" xmlns:p14="http://schemas.microsoft.com/office/powerpoint/2010/main" val="989869968"/>
       </p:ext>
     </p:extLst>
   </p:cSld>
@@ -1324,7 +1324,7 @@
     </p:spTree>
     <p:extLst>
       <p:ext uri="{BB962C8B-B14F-4D97-AF65-F5344CB8AC3E}">
-        <p14:creationId xmlns:p14="http://schemas.microsoft.com/office/powerpoint/2010/main" xmlns="" val="1452775338"/>
+        <p14:creationId xmlns="" xmlns:p14="http://schemas.microsoft.com/office/powerpoint/2010/main" val="1452775338"/>
       </p:ext>
     </p:extLst>
   </p:cSld>
@@ -1512,7 +1512,7 @@
     </p:spTree>
     <p:extLst>
       <p:ext uri="{BB962C8B-B14F-4D97-AF65-F5344CB8AC3E}">
-        <p14:creationId xmlns:p14="http://schemas.microsoft.com/office/powerpoint/2010/main" xmlns="" val="3894337954"/>
+        <p14:creationId xmlns="" xmlns:p14="http://schemas.microsoft.com/office/powerpoint/2010/main" val="3894337954"/>
       </p:ext>
     </p:extLst>
   </p:cSld>
@@ -1762,7 +1762,7 @@
     </p:spTree>
     <p:extLst>
       <p:ext uri="{BB962C8B-B14F-4D97-AF65-F5344CB8AC3E}">
-        <p14:creationId xmlns:p14="http://schemas.microsoft.com/office/powerpoint/2010/main" xmlns="" val="1362160421"/>
+        <p14:creationId xmlns="" xmlns:p14="http://schemas.microsoft.com/office/powerpoint/2010/main" val="1362160421"/>
       </p:ext>
     </p:extLst>
   </p:cSld>
@@ -1950,7 +1950,7 @@
     </p:spTree>
     <p:extLst>
       <p:ext uri="{BB962C8B-B14F-4D97-AF65-F5344CB8AC3E}">
-        <p14:creationId xmlns:p14="http://schemas.microsoft.com/office/powerpoint/2010/main" xmlns="" val="1001508708"/>
+        <p14:creationId xmlns="" xmlns:p14="http://schemas.microsoft.com/office/powerpoint/2010/main" val="1001508708"/>
       </p:ext>
     </p:extLst>
   </p:cSld>
@@ -2204,7 +2204,7 @@
     </p:spTree>
     <p:extLst>
       <p:ext uri="{BB962C8B-B14F-4D97-AF65-F5344CB8AC3E}">
-        <p14:creationId xmlns:p14="http://schemas.microsoft.com/office/powerpoint/2010/main" xmlns="" val="3465844944"/>
+        <p14:creationId xmlns="" xmlns:p14="http://schemas.microsoft.com/office/powerpoint/2010/main" val="3465844944"/>
       </p:ext>
     </p:extLst>
   </p:cSld>
@@ -2508,7 +2508,7 @@
     </p:spTree>
     <p:extLst>
       <p:ext uri="{BB962C8B-B14F-4D97-AF65-F5344CB8AC3E}">
-        <p14:creationId xmlns:p14="http://schemas.microsoft.com/office/powerpoint/2010/main" xmlns="" val="3500538590"/>
+        <p14:creationId xmlns="" xmlns:p14="http://schemas.microsoft.com/office/powerpoint/2010/main" val="3500538590"/>
       </p:ext>
     </p:extLst>
   </p:cSld>
@@ -2952,7 +2952,7 @@
     </p:spTree>
     <p:extLst>
       <p:ext uri="{BB962C8B-B14F-4D97-AF65-F5344CB8AC3E}">
-        <p14:creationId xmlns:p14="http://schemas.microsoft.com/office/powerpoint/2010/main" xmlns="" val="1822163244"/>
+        <p14:creationId xmlns="" xmlns:p14="http://schemas.microsoft.com/office/powerpoint/2010/main" val="1822163244"/>
       </p:ext>
     </p:extLst>
   </p:cSld>
@@ -3049,7 +3049,7 @@
     </p:spTree>
     <p:extLst>
       <p:ext uri="{BB962C8B-B14F-4D97-AF65-F5344CB8AC3E}">
-        <p14:creationId xmlns:p14="http://schemas.microsoft.com/office/powerpoint/2010/main" xmlns="" val="2405767068"/>
+        <p14:creationId xmlns="" xmlns:p14="http://schemas.microsoft.com/office/powerpoint/2010/main" val="2405767068"/>
       </p:ext>
     </p:extLst>
   </p:cSld>
@@ -3337,7 +3337,7 @@
     </p:spTree>
     <p:extLst>
       <p:ext uri="{BB962C8B-B14F-4D97-AF65-F5344CB8AC3E}">
-        <p14:creationId xmlns:p14="http://schemas.microsoft.com/office/powerpoint/2010/main" xmlns="" val="1001517974"/>
+        <p14:creationId xmlns="" xmlns:p14="http://schemas.microsoft.com/office/powerpoint/2010/main" val="1001517974"/>
       </p:ext>
     </p:extLst>
   </p:cSld>
@@ -3601,7 +3601,7 @@
     </p:spTree>
     <p:extLst>
       <p:ext uri="{BB962C8B-B14F-4D97-AF65-F5344CB8AC3E}">
-        <p14:creationId xmlns:p14="http://schemas.microsoft.com/office/powerpoint/2010/main" xmlns="" val="1032843098"/>
+        <p14:creationId xmlns="" xmlns:p14="http://schemas.microsoft.com/office/powerpoint/2010/main" val="1032843098"/>
       </p:ext>
     </p:extLst>
   </p:cSld>
@@ -3761,7 +3761,7 @@
     </p:spTree>
     <p:extLst>
       <p:ext uri="{BB962C8B-B14F-4D97-AF65-F5344CB8AC3E}">
-        <p14:creationId xmlns:p14="http://schemas.microsoft.com/office/powerpoint/2010/main" xmlns="" val="2425591320"/>
+        <p14:creationId xmlns="" xmlns:p14="http://schemas.microsoft.com/office/powerpoint/2010/main" val="2425591320"/>
       </p:ext>
     </p:extLst>
   </p:cSld>
@@ -4118,9 +4118,40 @@
           </a:p>
         </p:txBody>
       </p:sp>
+      <p:sp>
+        <p:nvSpPr>
+          <p:cNvPr id="6" name="TextBox 5"/>
+          <p:cNvSpPr txBox="1"/>
+          <p:nvPr/>
+        </p:nvSpPr>
+        <p:spPr>
+          <a:xfrm>
+            <a:off x="2971800" y="4876800"/>
+            <a:ext cx="6019800" cy="523220"/>
+          </a:xfrm>
+          <a:prstGeom prst="rect">
+            <a:avLst/>
+          </a:prstGeom>
+          <a:noFill/>
+        </p:spPr>
+        <p:txBody>
+          <a:bodyPr wrap="square" rtlCol="0">
+            <a:spAutoFit/>
+          </a:bodyPr>
+          <a:lstStyle/>
+          <a:p>
+            <a:pPr algn="ctr"/>
+            <a:r>
+              <a:rPr lang="en-US" sz="2800" smtClean="0"/>
+              <a:t>Jonathan Bromley, André Winkelmann</a:t>
+            </a:r>
+            <a:endParaRPr lang="en-US" sz="2800" dirty="0"/>
+          </a:p>
+        </p:txBody>
+      </p:sp>
       <p:pic>
         <p:nvPicPr>
-          <p:cNvPr id="1026" name="Picture 2" descr="C:\SHARES\shared_data\jonathan\verilab\conferences\dvcon\2011\presentation\verilab-440-72.jpg"/>
+          <p:cNvPr id="1027" name="Picture 3" descr="C:\SHARES\shared_data\jonathan\verilab\tech\signal_probe\svlib\doc\verilab-880-144.jpg"/>
           <p:cNvPicPr>
             <a:picLocks noChangeAspect="1" noChangeArrowheads="1"/>
           </p:cNvPicPr>
@@ -4135,8 +4166,8 @@
         </p:blipFill>
         <p:spPr bwMode="auto">
           <a:xfrm>
-            <a:off x="2971800" y="5566910"/>
-            <a:ext cx="6019800" cy="983115"/>
+            <a:off x="2971799" y="5570084"/>
+            <a:ext cx="6019801" cy="983116"/>
           </a:xfrm>
           <a:prstGeom prst="rect">
             <a:avLst/>
@@ -4144,41 +4175,10 @@
           <a:noFill/>
         </p:spPr>
       </p:pic>
-      <p:sp>
-        <p:nvSpPr>
-          <p:cNvPr id="6" name="TextBox 5"/>
-          <p:cNvSpPr txBox="1"/>
-          <p:nvPr/>
-        </p:nvSpPr>
-        <p:spPr>
-          <a:xfrm>
-            <a:off x="2971800" y="4876800"/>
-            <a:ext cx="6019800" cy="523220"/>
-          </a:xfrm>
-          <a:prstGeom prst="rect">
-            <a:avLst/>
-          </a:prstGeom>
-          <a:noFill/>
-        </p:spPr>
-        <p:txBody>
-          <a:bodyPr wrap="square" rtlCol="0">
-            <a:spAutoFit/>
-          </a:bodyPr>
-          <a:lstStyle/>
-          <a:p>
-            <a:pPr algn="ctr"/>
-            <a:r>
-              <a:rPr lang="en-US" sz="2800" smtClean="0"/>
-              <a:t>Jonathan Bromley, André Winkelmann</a:t>
-            </a:r>
-            <a:endParaRPr lang="en-US" sz="2800" dirty="0"/>
-          </a:p>
-        </p:txBody>
-      </p:sp>
     </p:spTree>
     <p:extLst>
       <p:ext uri="{BB962C8B-B14F-4D97-AF65-F5344CB8AC3E}">
-        <p14:creationId xmlns:p14="http://schemas.microsoft.com/office/powerpoint/2010/main" xmlns="" val="3983013449"/>
+        <p14:creationId xmlns="" xmlns:p14="http://schemas.microsoft.com/office/powerpoint/2010/main" val="3983013449"/>
       </p:ext>
     </p:extLst>
   </p:cSld>
@@ -7203,7 +7203,7 @@
       </p:sp>
       <p:pic>
         <p:nvPicPr>
-          <p:cNvPr id="11" name="Picture 2" descr="C:\SHARES\shared_data\jonathan\verilab\conferences\dvcon\2011\presentation\verilab-440-72.jpg"/>
+          <p:cNvPr id="8" name="Picture 3" descr="C:\SHARES\shared_data\jonathan\verilab\tech\signal_probe\svlib\doc\verilab-880-144.jpg"/>
           <p:cNvPicPr>
             <a:picLocks noChangeAspect="1" noChangeArrowheads="1"/>
           </p:cNvPicPr>
@@ -7218,7 +7218,7 @@
         </p:blipFill>
         <p:spPr bwMode="auto">
           <a:xfrm>
-            <a:off x="4876800" y="5878022"/>
+            <a:off x="4876800" y="5881196"/>
             <a:ext cx="4114800" cy="672003"/>
           </a:xfrm>
           <a:prstGeom prst="rect">

</xml_diff>